<commit_message>
Deployed a82a1b6 with MkDocs version: 1.1.2
</commit_message>
<xml_diff>
--- a/slides/Unit28_Struct.pptx
+++ b/slides/Unit28_Struct.pptx
@@ -186,7 +186,7 @@
 <file path=ppt/revisionInfo.xml><?xml version="1.0" encoding="utf-8"?>
 <p1510:revInfo xmlns:a="http://schemas.openxmlformats.org/drawingml/2006/main" xmlns:r="http://schemas.openxmlformats.org/officeDocument/2006/relationships" xmlns:p1510="http://schemas.microsoft.com/office/powerpoint/2015/10/main">
   <p1510:revLst>
-    <p1510:client id="{2F5160B5-190D-47F4-8B49-2756B7773FD5}" v="921" dt="2021-04-05T01:11:39.063"/>
+    <p1510:client id="{2F5160B5-190D-47F4-8B49-2756B7773FD5}" v="932" dt="2021-04-06T05:17:49.620"/>
   </p1510:revLst>
 </p1510:revInfo>
 </file>
@@ -4679,7 +4679,7 @@
   <pc:docChgLst>
     <pc:chgData name="Zhao Jin" userId="cd05a825-544c-438a-9ba1-08e63db50b47" providerId="ADAL" clId="{2F5160B5-190D-47F4-8B49-2756B7773FD5}"/>
     <pc:docChg chg="undo custSel addSld delSld modSld">
-      <pc:chgData name="Zhao Jin" userId="cd05a825-544c-438a-9ba1-08e63db50b47" providerId="ADAL" clId="{2F5160B5-190D-47F4-8B49-2756B7773FD5}" dt="2021-04-05T01:11:39.063" v="4068"/>
+      <pc:chgData name="Zhao Jin" userId="cd05a825-544c-438a-9ba1-08e63db50b47" providerId="ADAL" clId="{2F5160B5-190D-47F4-8B49-2756B7773FD5}" dt="2021-04-06T05:17:49.620" v="4079" actId="207"/>
       <pc:docMkLst>
         <pc:docMk/>
       </pc:docMkLst>
@@ -5493,7 +5493,7 @@
         </pc:sldMkLst>
       </pc:sldChg>
       <pc:sldChg chg="addSp delSp modSp add mod delAnim modAnim">
-        <pc:chgData name="Zhao Jin" userId="cd05a825-544c-438a-9ba1-08e63db50b47" providerId="ADAL" clId="{2F5160B5-190D-47F4-8B49-2756B7773FD5}" dt="2021-04-05T01:11:39.063" v="4068"/>
+        <pc:chgData name="Zhao Jin" userId="cd05a825-544c-438a-9ba1-08e63db50b47" providerId="ADAL" clId="{2F5160B5-190D-47F4-8B49-2756B7773FD5}" dt="2021-04-06T05:17:49.620" v="4079" actId="207"/>
         <pc:sldMkLst>
           <pc:docMk/>
           <pc:sldMk cId="997017972" sldId="650"/>
@@ -5531,7 +5531,7 @@
           </ac:spMkLst>
         </pc:spChg>
         <pc:spChg chg="add mod">
-          <ac:chgData name="Zhao Jin" userId="cd05a825-544c-438a-9ba1-08e63db50b47" providerId="ADAL" clId="{2F5160B5-190D-47F4-8B49-2756B7773FD5}" dt="2021-03-16T06:18:47.964" v="3703" actId="1036"/>
+          <ac:chgData name="Zhao Jin" userId="cd05a825-544c-438a-9ba1-08e63db50b47" providerId="ADAL" clId="{2F5160B5-190D-47F4-8B49-2756B7773FD5}" dt="2021-04-06T05:17:07.662" v="4078" actId="20577"/>
           <ac:spMkLst>
             <pc:docMk/>
             <pc:sldMk cId="997017972" sldId="650"/>
@@ -5539,7 +5539,7 @@
           </ac:spMkLst>
         </pc:spChg>
         <pc:spChg chg="add mod">
-          <ac:chgData name="Zhao Jin" userId="cd05a825-544c-438a-9ba1-08e63db50b47" providerId="ADAL" clId="{2F5160B5-190D-47F4-8B49-2756B7773FD5}" dt="2021-03-16T06:18:47.964" v="3703" actId="1036"/>
+          <ac:chgData name="Zhao Jin" userId="cd05a825-544c-438a-9ba1-08e63db50b47" providerId="ADAL" clId="{2F5160B5-190D-47F4-8B49-2756B7773FD5}" dt="2021-04-06T05:17:49.620" v="4079" actId="207"/>
           <ac:spMkLst>
             <pc:docMk/>
             <pc:sldMk cId="997017972" sldId="650"/>
@@ -5618,8 +5618,8 @@
             <ac:spMk id="23" creationId="{41B47849-967C-4D16-A8E9-D329B7EFBFD7}"/>
           </ac:spMkLst>
         </pc:spChg>
-        <pc:spChg chg="add mod">
-          <ac:chgData name="Zhao Jin" userId="cd05a825-544c-438a-9ba1-08e63db50b47" providerId="ADAL" clId="{2F5160B5-190D-47F4-8B49-2756B7773FD5}" dt="2021-03-16T06:18:54.512" v="3704" actId="20577"/>
+        <pc:spChg chg="add mod ord">
+          <ac:chgData name="Zhao Jin" userId="cd05a825-544c-438a-9ba1-08e63db50b47" providerId="ADAL" clId="{2F5160B5-190D-47F4-8B49-2756B7773FD5}" dt="2021-04-06T05:14:27.780" v="4071" actId="167"/>
           <ac:spMkLst>
             <pc:docMk/>
             <pc:sldMk cId="997017972" sldId="650"/>
@@ -10066,7 +10066,7 @@
               <a:pPr>
                 <a:defRPr/>
               </a:pPr>
-              <a:t>4/5/2021</a:t>
+              <a:t>4/6/2021</a:t>
             </a:fld>
             <a:endParaRPr lang="en-US" dirty="0"/>
           </a:p>
@@ -16189,6 +16189,127 @@
       </p:grpSpPr>
       <p:sp>
         <p:nvSpPr>
+          <p:cNvPr id="24" name="Rectangle 8">
+            <a:extLst>
+              <a:ext uri="{FF2B5EF4-FFF2-40B4-BE49-F238E27FC236}">
+                <a16:creationId xmlns:a16="http://schemas.microsoft.com/office/drawing/2014/main" id="{793BC6DB-2155-470B-9458-43CFA2CF6575}"/>
+              </a:ext>
+            </a:extLst>
+          </p:cNvPr>
+          <p:cNvSpPr>
+            <a:spLocks noChangeArrowheads="1"/>
+          </p:cNvSpPr>
+          <p:nvPr/>
+        </p:nvSpPr>
+        <p:spPr bwMode="auto">
+          <a:xfrm>
+            <a:off x="733425" y="1460500"/>
+            <a:ext cx="8181975" cy="6532793"/>
+          </a:xfrm>
+          <a:prstGeom prst="rect">
+            <a:avLst/>
+          </a:prstGeom>
+          <a:noFill/>
+          <a:ln w="9525">
+            <a:noFill/>
+            <a:miter lim="800000"/>
+            <a:headEnd/>
+            <a:tailEnd/>
+          </a:ln>
+        </p:spPr>
+        <p:txBody>
+          <a:bodyPr/>
+          <a:lstStyle/>
+          <a:p>
+            <a:pPr marL="342900" indent="-342900">
+              <a:spcBef>
+                <a:spcPts val="600"/>
+              </a:spcBef>
+              <a:buClr>
+                <a:schemeClr val="tx1">
+                  <a:lumMod val="90000"/>
+                  <a:lumOff val="10000"/>
+                </a:schemeClr>
+              </a:buClr>
+              <a:buSzPct val="100000"/>
+              <a:buFont typeface="Wingdings" panose="05000000000000000000" pitchFamily="2" charset="2"/>
+              <a:buChar char="§"/>
+            </a:pPr>
+            <a:r>
+              <a:rPr lang="en-US" sz="2400" dirty="0"/>
+              <a:t>typedef allows new data types to be defined.</a:t>
+            </a:r>
+          </a:p>
+          <a:p>
+            <a:pPr marL="800100" lvl="1" indent="-342900">
+              <a:spcBef>
+                <a:spcPts val="600"/>
+              </a:spcBef>
+              <a:buClr>
+                <a:schemeClr val="tx1">
+                  <a:lumMod val="90000"/>
+                  <a:lumOff val="10000"/>
+                </a:schemeClr>
+              </a:buClr>
+              <a:buSzPct val="100000"/>
+              <a:buFont typeface="Wingdings" panose="05000000000000000000" pitchFamily="2" charset="2"/>
+              <a:buChar char="§"/>
+            </a:pPr>
+            <a:endParaRPr lang="en-US" sz="2400" dirty="0"/>
+          </a:p>
+          <a:p>
+            <a:pPr marL="800100" lvl="1" indent="-342900">
+              <a:spcBef>
+                <a:spcPts val="600"/>
+              </a:spcBef>
+              <a:buClr>
+                <a:schemeClr val="tx1">
+                  <a:lumMod val="90000"/>
+                  <a:lumOff val="10000"/>
+                </a:schemeClr>
+              </a:buClr>
+              <a:buSzPct val="100000"/>
+              <a:buFont typeface="Wingdings" panose="05000000000000000000" pitchFamily="2" charset="2"/>
+              <a:buChar char="§"/>
+            </a:pPr>
+            <a:endParaRPr lang="en-US" sz="2400" dirty="0"/>
+          </a:p>
+          <a:p>
+            <a:pPr marL="800100" lvl="1" indent="-342900">
+              <a:spcBef>
+                <a:spcPts val="600"/>
+              </a:spcBef>
+              <a:buClr>
+                <a:schemeClr val="tx1">
+                  <a:lumMod val="90000"/>
+                  <a:lumOff val="10000"/>
+                </a:schemeClr>
+              </a:buClr>
+              <a:buSzPct val="100000"/>
+              <a:buFont typeface="Wingdings" panose="05000000000000000000" pitchFamily="2" charset="2"/>
+              <a:buChar char="§"/>
+            </a:pPr>
+            <a:endParaRPr lang="en-US" sz="2400" dirty="0"/>
+          </a:p>
+          <a:p>
+            <a:pPr lvl="1">
+              <a:spcBef>
+                <a:spcPts val="600"/>
+              </a:spcBef>
+              <a:buClr>
+                <a:schemeClr val="tx1">
+                  <a:lumMod val="90000"/>
+                  <a:lumOff val="10000"/>
+                </a:schemeClr>
+              </a:buClr>
+              <a:buSzPct val="100000"/>
+            </a:pPr>
+            <a:endParaRPr lang="en-US" sz="1600" dirty="0"/>
+          </a:p>
+        </p:txBody>
+      </p:sp>
+      <p:sp>
+        <p:nvSpPr>
           <p:cNvPr id="14338" name="Rectangle 2"/>
           <p:cNvSpPr>
             <a:spLocks noGrp="1" noChangeArrowheads="1"/>
@@ -16771,7 +16892,7 @@
                 </a:solidFill>
                 <a:latin typeface="Courier New" pitchFamily="49" charset="0"/>
               </a:rPr>
-              <a:t>}</a:t>
+              <a:t>} module</a:t>
             </a:r>
             <a:r>
               <a:rPr lang="en-US" sz="2000" b="1" dirty="0">
@@ -17014,18 +17135,9 @@
             </a:r>
             <a:r>
               <a:rPr lang="en-US" sz="2000" b="1" dirty="0">
-                <a:solidFill>
-                  <a:srgbClr val="7030A0"/>
-                </a:solidFill>
-                <a:latin typeface="Courier New" pitchFamily="49" charset="0"/>
-              </a:rPr>
-              <a:t>module</a:t>
-            </a:r>
-            <a:r>
-              <a:rPr lang="en-US" sz="2000" b="1" dirty="0">
-                <a:latin typeface="Courier New" pitchFamily="49" charset="0"/>
-              </a:rPr>
-              <a:t>;</a:t>
+                <a:latin typeface="Courier New" pitchFamily="49" charset="0"/>
+              </a:rPr>
+              <a:t>module;</a:t>
             </a:r>
           </a:p>
           <a:p>
@@ -17225,127 +17337,6 @@
                 <a:srgbClr val="FF0000"/>
               </a:solidFill>
             </a:endParaRPr>
-          </a:p>
-        </p:txBody>
-      </p:sp>
-      <p:sp>
-        <p:nvSpPr>
-          <p:cNvPr id="24" name="Rectangle 8">
-            <a:extLst>
-              <a:ext uri="{FF2B5EF4-FFF2-40B4-BE49-F238E27FC236}">
-                <a16:creationId xmlns:a16="http://schemas.microsoft.com/office/drawing/2014/main" id="{793BC6DB-2155-470B-9458-43CFA2CF6575}"/>
-              </a:ext>
-            </a:extLst>
-          </p:cNvPr>
-          <p:cNvSpPr>
-            <a:spLocks noChangeArrowheads="1"/>
-          </p:cNvSpPr>
-          <p:nvPr/>
-        </p:nvSpPr>
-        <p:spPr bwMode="auto">
-          <a:xfrm>
-            <a:off x="733425" y="1460500"/>
-            <a:ext cx="8181975" cy="6532793"/>
-          </a:xfrm>
-          <a:prstGeom prst="rect">
-            <a:avLst/>
-          </a:prstGeom>
-          <a:noFill/>
-          <a:ln w="9525">
-            <a:noFill/>
-            <a:miter lim="800000"/>
-            <a:headEnd/>
-            <a:tailEnd/>
-          </a:ln>
-        </p:spPr>
-        <p:txBody>
-          <a:bodyPr/>
-          <a:lstStyle/>
-          <a:p>
-            <a:pPr marL="342900" indent="-342900">
-              <a:spcBef>
-                <a:spcPts val="600"/>
-              </a:spcBef>
-              <a:buClr>
-                <a:schemeClr val="tx1">
-                  <a:lumMod val="90000"/>
-                  <a:lumOff val="10000"/>
-                </a:schemeClr>
-              </a:buClr>
-              <a:buSzPct val="100000"/>
-              <a:buFont typeface="Wingdings" panose="05000000000000000000" pitchFamily="2" charset="2"/>
-              <a:buChar char="§"/>
-            </a:pPr>
-            <a:r>
-              <a:rPr lang="en-US" sz="2400" dirty="0"/>
-              <a:t>typedef allows new data types to be defined.</a:t>
-            </a:r>
-          </a:p>
-          <a:p>
-            <a:pPr marL="800100" lvl="1" indent="-342900">
-              <a:spcBef>
-                <a:spcPts val="600"/>
-              </a:spcBef>
-              <a:buClr>
-                <a:schemeClr val="tx1">
-                  <a:lumMod val="90000"/>
-                  <a:lumOff val="10000"/>
-                </a:schemeClr>
-              </a:buClr>
-              <a:buSzPct val="100000"/>
-              <a:buFont typeface="Wingdings" panose="05000000000000000000" pitchFamily="2" charset="2"/>
-              <a:buChar char="§"/>
-            </a:pPr>
-            <a:endParaRPr lang="en-US" sz="2400" dirty="0"/>
-          </a:p>
-          <a:p>
-            <a:pPr marL="800100" lvl="1" indent="-342900">
-              <a:spcBef>
-                <a:spcPts val="600"/>
-              </a:spcBef>
-              <a:buClr>
-                <a:schemeClr val="tx1">
-                  <a:lumMod val="90000"/>
-                  <a:lumOff val="10000"/>
-                </a:schemeClr>
-              </a:buClr>
-              <a:buSzPct val="100000"/>
-              <a:buFont typeface="Wingdings" panose="05000000000000000000" pitchFamily="2" charset="2"/>
-              <a:buChar char="§"/>
-            </a:pPr>
-            <a:endParaRPr lang="en-US" sz="2400" dirty="0"/>
-          </a:p>
-          <a:p>
-            <a:pPr marL="800100" lvl="1" indent="-342900">
-              <a:spcBef>
-                <a:spcPts val="600"/>
-              </a:spcBef>
-              <a:buClr>
-                <a:schemeClr val="tx1">
-                  <a:lumMod val="90000"/>
-                  <a:lumOff val="10000"/>
-                </a:schemeClr>
-              </a:buClr>
-              <a:buSzPct val="100000"/>
-              <a:buFont typeface="Wingdings" panose="05000000000000000000" pitchFamily="2" charset="2"/>
-              <a:buChar char="§"/>
-            </a:pPr>
-            <a:endParaRPr lang="en-US" sz="2400" dirty="0"/>
-          </a:p>
-          <a:p>
-            <a:pPr lvl="1">
-              <a:spcBef>
-                <a:spcPts val="600"/>
-              </a:spcBef>
-              <a:buClr>
-                <a:schemeClr val="tx1">
-                  <a:lumMod val="90000"/>
-                  <a:lumOff val="10000"/>
-                </a:schemeClr>
-              </a:buClr>
-              <a:buSzPct val="100000"/>
-            </a:pPr>
-            <a:endParaRPr lang="en-US" sz="1600" dirty="0"/>
           </a:p>
         </p:txBody>
       </p:sp>

</xml_diff>